<commit_message>
Update Week 2, 4, 5 notebooks and improve Mid Semester Expo presentation
- Refine notebook content and visualizations for weeks 2-5
- Improve presentation text clarity, grammar, and formatting
- Enhance slide content structure and readability

Co-Authored-By: Claude Haiku 4.5 <noreply@anthropic.com>
</commit_message>
<xml_diff>
--- a/slides/Mid Sem Expo.pptx
+++ b/slides/Mid Sem Expo.pptx
@@ -7888,7 +7888,7 @@
 </file>
 
 <file path=ppt/slides/slide1.xml><?xml version="1.0" encoding="utf-8"?>
-<p:sld xmlns:a="http://schemas.openxmlformats.org/drawingml/2006/main" xmlns:r="http://schemas.openxmlformats.org/officeDocument/2006/relationships" xmlns:p="http://schemas.openxmlformats.org/presentationml/2006/main">
+<p:sld xmlns:a="http://schemas.openxmlformats.org/drawingml/2006/main" xmlns:p="http://schemas.openxmlformats.org/presentationml/2006/main" xmlns:r="http://schemas.openxmlformats.org/officeDocument/2006/relationships">
   <p:cSld>
     <p:bg>
       <p:bgPr>
@@ -8089,7 +8089,7 @@
                 </a:solidFill>
                 <a:latin typeface="Times New Roman"/>
               </a:rPr>
-              <a:t> Zhang</a:t>
+              <a:t>Zhang</a:t>
             </a:r>
             <a:br>
               <a:rPr sz="3200" dirty="0"/>
@@ -8112,7 +8112,7 @@
 </file>
 
 <file path=ppt/slides/slide10.xml><?xml version="1.0" encoding="utf-8"?>
-<p:sld xmlns:a="http://schemas.openxmlformats.org/drawingml/2006/main" xmlns:r="http://schemas.openxmlformats.org/officeDocument/2006/relationships" xmlns:p="http://schemas.openxmlformats.org/presentationml/2006/main">
+<p:sld xmlns:a="http://schemas.openxmlformats.org/drawingml/2006/main" xmlns:ns2="http://schemas.microsoft.com/office/drawing/2014/main" xmlns:ns4="http://schemas.microsoft.com/office/powerpoint/2010/main" xmlns:p="http://schemas.openxmlformats.org/presentationml/2006/main" xmlns:r="http://schemas.openxmlformats.org/officeDocument/2006/relationships">
   <p:cSld>
     <p:spTree>
       <p:nvGrpSpPr>
@@ -8133,7 +8133,7 @@
           <p:cNvPr id="4" name="TextBox 4">
             <a:extLst>
               <a:ext uri="{FF2B5EF4-FFF2-40B4-BE49-F238E27FC236}">
-                <a16:creationId xmlns:a16="http://schemas.microsoft.com/office/drawing/2014/main" id="{DD1DA551-9A65-0ACF-F22D-5F03A63ED80B}"/>
+                <ns2:creationId id="{DD1DA551-9A65-0ACF-F22D-5F03A63ED80B}"/>
               </a:ext>
             </a:extLst>
           </p:cNvPr>
@@ -8190,7 +8190,7 @@
           <p:cNvPr id="5" name="TextBox 4">
             <a:extLst>
               <a:ext uri="{FF2B5EF4-FFF2-40B4-BE49-F238E27FC236}">
-                <a16:creationId xmlns:a16="http://schemas.microsoft.com/office/drawing/2014/main" id="{CAA38EA8-2C4A-8629-D9C3-28D62959D9C3}"/>
+                <ns2:creationId id="{CAA38EA8-2C4A-8629-D9C3-28D62959D9C3}"/>
               </a:ext>
             </a:extLst>
           </p:cNvPr>
@@ -8234,7 +8234,7 @@
           <p:cNvPr id="6" name="Picture 5">
             <a:extLst>
               <a:ext uri="{FF2B5EF4-FFF2-40B4-BE49-F238E27FC236}">
-                <a16:creationId xmlns:a16="http://schemas.microsoft.com/office/drawing/2014/main" id="{F31DBBDA-5F95-F6B5-C347-E8278AA00C75}"/>
+                <ns2:creationId id="{F31DBBDA-5F95-F6B5-C347-E8278AA00C75}"/>
               </a:ext>
             </a:extLst>
           </p:cNvPr>
@@ -8264,7 +8264,7 @@
           <p:cNvPr id="8" name="TextBox 7">
             <a:extLst>
               <a:ext uri="{FF2B5EF4-FFF2-40B4-BE49-F238E27FC236}">
-                <a16:creationId xmlns:a16="http://schemas.microsoft.com/office/drawing/2014/main" id="{B8C5EEBC-E23A-1D52-FD8D-218C3780F0DC}"/>
+                <ns2:creationId id="{B8C5EEBC-E23A-1D52-FD8D-218C3780F0DC}"/>
               </a:ext>
             </a:extLst>
           </p:cNvPr>
@@ -8302,7 +8302,7 @@
           <p:cNvPr id="9" name="Picture 8">
             <a:extLst>
               <a:ext uri="{FF2B5EF4-FFF2-40B4-BE49-F238E27FC236}">
-                <a16:creationId xmlns:a16="http://schemas.microsoft.com/office/drawing/2014/main" id="{B561C098-4893-46FC-95D3-25CD4E7F93F9}"/>
+                <ns2:creationId id="{B561C098-4893-46FC-95D3-25CD4E7F93F9}"/>
               </a:ext>
             </a:extLst>
           </p:cNvPr>
@@ -8332,7 +8332,7 @@
           <p:cNvPr id="10" name="Picture 9">
             <a:extLst>
               <a:ext uri="{FF2B5EF4-FFF2-40B4-BE49-F238E27FC236}">
-                <a16:creationId xmlns:a16="http://schemas.microsoft.com/office/drawing/2014/main" id="{6C8485CC-8102-49B4-B069-411E0387740C}"/>
+                <ns2:creationId id="{6C8485CC-8102-49B4-B069-411E0387740C}"/>
               </a:ext>
             </a:extLst>
           </p:cNvPr>
@@ -8359,7 +8359,7 @@
     </p:spTree>
     <p:extLst>
       <p:ext uri="{BB962C8B-B14F-4D97-AF65-F5344CB8AC3E}">
-        <p14:creationId xmlns:p14="http://schemas.microsoft.com/office/powerpoint/2010/main" val="3963058444"/>
+        <ns4:creationId val="3963058444"/>
       </p:ext>
     </p:extLst>
   </p:cSld>
@@ -8370,7 +8370,7 @@
 </file>
 
 <file path=ppt/slides/slide11.xml><?xml version="1.0" encoding="utf-8"?>
-<p:sld xmlns:a="http://schemas.openxmlformats.org/drawingml/2006/main" xmlns:r="http://schemas.openxmlformats.org/officeDocument/2006/relationships" xmlns:p="http://schemas.openxmlformats.org/presentationml/2006/main">
+<p:sld xmlns:a="http://schemas.openxmlformats.org/drawingml/2006/main" xmlns:ns2="http://schemas.microsoft.com/office/drawing/2014/main" xmlns:ns4="http://schemas.microsoft.com/office/drawing/2010/main" xmlns:ns5="http://schemas.microsoft.com/office/powerpoint/2010/main" xmlns:p="http://schemas.openxmlformats.org/presentationml/2006/main" xmlns:r="http://schemas.openxmlformats.org/officeDocument/2006/relationships">
   <p:cSld>
     <p:spTree>
       <p:nvGrpSpPr>
@@ -8391,7 +8391,7 @@
           <p:cNvPr id="4" name="TextBox 4">
             <a:extLst>
               <a:ext uri="{FF2B5EF4-FFF2-40B4-BE49-F238E27FC236}">
-                <a16:creationId xmlns:a16="http://schemas.microsoft.com/office/drawing/2014/main" id="{A5733C39-E375-DFB1-3E3F-20C7C9E59D0D}"/>
+                <ns2:creationId id="{A5733C39-E375-DFB1-3E3F-20C7C9E59D0D}"/>
               </a:ext>
             </a:extLst>
           </p:cNvPr>
@@ -8448,7 +8448,7 @@
           <p:cNvPr id="5" name="TextBox 4">
             <a:extLst>
               <a:ext uri="{FF2B5EF4-FFF2-40B4-BE49-F238E27FC236}">
-                <a16:creationId xmlns:a16="http://schemas.microsoft.com/office/drawing/2014/main" id="{F9909725-A656-0928-1937-5C927C4EF43E}"/>
+                <ns2:creationId id="{F9909725-A656-0928-1937-5C927C4EF43E}"/>
               </a:ext>
             </a:extLst>
           </p:cNvPr>
@@ -8486,7 +8486,7 @@
           <p:cNvPr id="7" name="Picture 6" descr="A screenshot of a table&#10;&#10;AI-generated content may be incorrect.">
             <a:extLst>
               <a:ext uri="{FF2B5EF4-FFF2-40B4-BE49-F238E27FC236}">
-                <a16:creationId xmlns:a16="http://schemas.microsoft.com/office/drawing/2014/main" id="{446499CF-8055-BE7D-2710-7ECD072FF90D}"/>
+                <ns2:creationId id="{446499CF-8055-BE7D-2710-7ECD072FF90D}"/>
               </a:ext>
             </a:extLst>
           </p:cNvPr>
@@ -8499,7 +8499,7 @@
           <a:blip r:embed="rId2">
             <a:extLst>
               <a:ext uri="{28A0092B-C50C-407E-A947-70E740481C1C}">
-                <a14:useLocalDpi xmlns:a14="http://schemas.microsoft.com/office/drawing/2010/main" val="0"/>
+                <ns4:useLocalDpi val="0"/>
               </a:ext>
             </a:extLst>
           </a:blip>
@@ -8522,7 +8522,7 @@
           <p:cNvPr id="8" name="TextBox 7">
             <a:extLst>
               <a:ext uri="{FF2B5EF4-FFF2-40B4-BE49-F238E27FC236}">
-                <a16:creationId xmlns:a16="http://schemas.microsoft.com/office/drawing/2014/main" id="{108BCB43-FAF1-393B-B3BC-8E996F49E27D}"/>
+                <ns2:creationId id="{108BCB43-FAF1-393B-B3BC-8E996F49E27D}"/>
               </a:ext>
             </a:extLst>
           </p:cNvPr>
@@ -8561,7 +8561,7 @@
           <p:cNvPr id="10" name="Picture 9" descr="A table of numbers and letters&#10;&#10;AI-generated content may be incorrect.">
             <a:extLst>
               <a:ext uri="{FF2B5EF4-FFF2-40B4-BE49-F238E27FC236}">
-                <a16:creationId xmlns:a16="http://schemas.microsoft.com/office/drawing/2014/main" id="{2FD9B7A8-6B3D-BDEF-829E-BA4B3DDCA5DE}"/>
+                <ns2:creationId id="{2FD9B7A8-6B3D-BDEF-829E-BA4B3DDCA5DE}"/>
               </a:ext>
             </a:extLst>
           </p:cNvPr>
@@ -8574,7 +8574,7 @@
           <a:blip r:embed="rId3">
             <a:extLst>
               <a:ext uri="{28A0092B-C50C-407E-A947-70E740481C1C}">
-                <a14:useLocalDpi xmlns:a14="http://schemas.microsoft.com/office/drawing/2010/main" val="0"/>
+                <ns4:useLocalDpi val="0"/>
               </a:ext>
             </a:extLst>
           </a:blip>
@@ -8595,7 +8595,7 @@
     </p:spTree>
     <p:extLst>
       <p:ext uri="{BB962C8B-B14F-4D97-AF65-F5344CB8AC3E}">
-        <p14:creationId xmlns:p14="http://schemas.microsoft.com/office/powerpoint/2010/main" val="1742820446"/>
+        <ns5:creationId val="1742820446"/>
       </p:ext>
     </p:extLst>
   </p:cSld>
@@ -8606,7 +8606,7 @@
 </file>
 
 <file path=ppt/slides/slide12.xml><?xml version="1.0" encoding="utf-8"?>
-<p:sld xmlns:a="http://schemas.openxmlformats.org/drawingml/2006/main" xmlns:r="http://schemas.openxmlformats.org/officeDocument/2006/relationships" xmlns:p="http://schemas.openxmlformats.org/presentationml/2006/main">
+<p:sld xmlns:a="http://schemas.openxmlformats.org/drawingml/2006/main" xmlns:ns2="http://schemas.microsoft.com/office/drawing/2014/main" xmlns:ns4="http://schemas.microsoft.com/office/powerpoint/2010/main" xmlns:p="http://schemas.openxmlformats.org/presentationml/2006/main" xmlns:r="http://schemas.openxmlformats.org/officeDocument/2006/relationships">
   <p:cSld>
     <p:spTree>
       <p:nvGrpSpPr>
@@ -8627,7 +8627,7 @@
           <p:cNvPr id="6" name="TextBox 4">
             <a:extLst>
               <a:ext uri="{FF2B5EF4-FFF2-40B4-BE49-F238E27FC236}">
-                <a16:creationId xmlns:a16="http://schemas.microsoft.com/office/drawing/2014/main" id="{CFB08EE3-6072-8216-5AAE-049EFE90A40B}"/>
+                <ns2:creationId id="{CFB08EE3-6072-8216-5AAE-049EFE90A40B}"/>
               </a:ext>
             </a:extLst>
           </p:cNvPr>
@@ -8684,7 +8684,7 @@
           <p:cNvPr id="7" name="Picture 6">
             <a:extLst>
               <a:ext uri="{FF2B5EF4-FFF2-40B4-BE49-F238E27FC236}">
-                <a16:creationId xmlns:a16="http://schemas.microsoft.com/office/drawing/2014/main" id="{ABFB35BD-1C56-8F3A-A6C8-570F4826547D}"/>
+                <ns2:creationId id="{ABFB35BD-1C56-8F3A-A6C8-570F4826547D}"/>
               </a:ext>
             </a:extLst>
           </p:cNvPr>
@@ -8714,7 +8714,7 @@
           <p:cNvPr id="8" name="TextBox 7">
             <a:extLst>
               <a:ext uri="{FF2B5EF4-FFF2-40B4-BE49-F238E27FC236}">
-                <a16:creationId xmlns:a16="http://schemas.microsoft.com/office/drawing/2014/main" id="{E158F1C1-C9BE-989A-761F-1E2D5C98BC4C}"/>
+                <ns2:creationId id="{E158F1C1-C9BE-989A-761F-1E2D5C98BC4C}"/>
               </a:ext>
             </a:extLst>
           </p:cNvPr>
@@ -8749,7 +8749,7 @@
           <p:cNvPr id="9" name="Picture 8">
             <a:extLst>
               <a:ext uri="{FF2B5EF4-FFF2-40B4-BE49-F238E27FC236}">
-                <a16:creationId xmlns:a16="http://schemas.microsoft.com/office/drawing/2014/main" id="{1FC76B1E-5591-4604-4695-555955531E00}"/>
+                <ns2:creationId id="{1FC76B1E-5591-4604-4695-555955531E00}"/>
               </a:ext>
             </a:extLst>
           </p:cNvPr>
@@ -8776,7 +8776,7 @@
     </p:spTree>
     <p:extLst>
       <p:ext uri="{BB962C8B-B14F-4D97-AF65-F5344CB8AC3E}">
-        <p14:creationId xmlns:p14="http://schemas.microsoft.com/office/powerpoint/2010/main" val="150878960"/>
+        <ns4:creationId val="150878960"/>
       </p:ext>
     </p:extLst>
   </p:cSld>
@@ -8787,7 +8787,7 @@
 </file>
 
 <file path=ppt/slides/slide13.xml><?xml version="1.0" encoding="utf-8"?>
-<p:sld xmlns:a="http://schemas.openxmlformats.org/drawingml/2006/main" xmlns:r="http://schemas.openxmlformats.org/officeDocument/2006/relationships" xmlns:p="http://schemas.openxmlformats.org/presentationml/2006/main">
+<p:sld xmlns:a="http://schemas.openxmlformats.org/drawingml/2006/main" xmlns:ns2="http://schemas.microsoft.com/office/drawing/2014/main" xmlns:ns4="http://schemas.microsoft.com/office/powerpoint/2010/main" xmlns:p="http://schemas.openxmlformats.org/presentationml/2006/main" xmlns:r="http://schemas.openxmlformats.org/officeDocument/2006/relationships">
   <p:cSld>
     <p:spTree>
       <p:nvGrpSpPr>
@@ -8808,7 +8808,7 @@
           <p:cNvPr id="5" name="Picture 4">
             <a:extLst>
               <a:ext uri="{FF2B5EF4-FFF2-40B4-BE49-F238E27FC236}">
-                <a16:creationId xmlns:a16="http://schemas.microsoft.com/office/drawing/2014/main" id="{41A308ED-6AD0-FF37-20D3-88635E080FF3}"/>
+                <ns2:creationId id="{41A308ED-6AD0-FF37-20D3-88635E080FF3}"/>
               </a:ext>
             </a:extLst>
           </p:cNvPr>
@@ -8837,7 +8837,7 @@
           <p:cNvPr id="6" name="TextBox 5">
             <a:extLst>
               <a:ext uri="{FF2B5EF4-FFF2-40B4-BE49-F238E27FC236}">
-                <a16:creationId xmlns:a16="http://schemas.microsoft.com/office/drawing/2014/main" id="{12665E70-5DDA-3CBC-ED70-06CF78D8D027}"/>
+                <ns2:creationId id="{12665E70-5DDA-3CBC-ED70-06CF78D8D027}"/>
               </a:ext>
             </a:extLst>
           </p:cNvPr>
@@ -8872,7 +8872,7 @@
           <p:cNvPr id="7" name="Picture 6">
             <a:extLst>
               <a:ext uri="{FF2B5EF4-FFF2-40B4-BE49-F238E27FC236}">
-                <a16:creationId xmlns:a16="http://schemas.microsoft.com/office/drawing/2014/main" id="{A7C4F3CC-326B-FE2D-8EA2-0B03CC467CCB}"/>
+                <ns2:creationId id="{A7C4F3CC-326B-FE2D-8EA2-0B03CC467CCB}"/>
               </a:ext>
             </a:extLst>
           </p:cNvPr>
@@ -8902,7 +8902,7 @@
           <p:cNvPr id="8" name="Picture 7">
             <a:extLst>
               <a:ext uri="{FF2B5EF4-FFF2-40B4-BE49-F238E27FC236}">
-                <a16:creationId xmlns:a16="http://schemas.microsoft.com/office/drawing/2014/main" id="{992E6546-3AEE-753C-3589-B2BF59F5F623}"/>
+                <ns2:creationId id="{992E6546-3AEE-753C-3589-B2BF59F5F623}"/>
               </a:ext>
             </a:extLst>
           </p:cNvPr>
@@ -8932,7 +8932,7 @@
           <p:cNvPr id="9" name="TextBox 8">
             <a:extLst>
               <a:ext uri="{FF2B5EF4-FFF2-40B4-BE49-F238E27FC236}">
-                <a16:creationId xmlns:a16="http://schemas.microsoft.com/office/drawing/2014/main" id="{A01D6ADB-1DF2-177A-BACD-04EA84BA9BC4}"/>
+                <ns2:creationId id="{A01D6ADB-1DF2-177A-BACD-04EA84BA9BC4}"/>
               </a:ext>
             </a:extLst>
           </p:cNvPr>
@@ -8970,7 +8970,7 @@
           <p:cNvPr id="10" name="TextBox 9">
             <a:extLst>
               <a:ext uri="{FF2B5EF4-FFF2-40B4-BE49-F238E27FC236}">
-                <a16:creationId xmlns:a16="http://schemas.microsoft.com/office/drawing/2014/main" id="{B9B63F07-2D89-7083-0B6B-BB0455C4C006}"/>
+                <ns2:creationId id="{B9B63F07-2D89-7083-0B6B-BB0455C4C006}"/>
               </a:ext>
             </a:extLst>
           </p:cNvPr>
@@ -9008,7 +9008,7 @@
           <p:cNvPr id="11" name="Picture 10">
             <a:extLst>
               <a:ext uri="{FF2B5EF4-FFF2-40B4-BE49-F238E27FC236}">
-                <a16:creationId xmlns:a16="http://schemas.microsoft.com/office/drawing/2014/main" id="{D8B012BC-AE98-EFA3-37DE-DC6F2F8472B5}"/>
+                <ns2:creationId id="{D8B012BC-AE98-EFA3-37DE-DC6F2F8472B5}"/>
               </a:ext>
             </a:extLst>
           </p:cNvPr>
@@ -9036,7 +9036,7 @@
     </p:spTree>
     <p:extLst>
       <p:ext uri="{BB962C8B-B14F-4D97-AF65-F5344CB8AC3E}">
-        <p14:creationId xmlns:p14="http://schemas.microsoft.com/office/powerpoint/2010/main" val="806456524"/>
+        <ns4:creationId val="806456524"/>
       </p:ext>
     </p:extLst>
   </p:cSld>
@@ -9047,7 +9047,7 @@
 </file>
 
 <file path=ppt/slides/slide14.xml><?xml version="1.0" encoding="utf-8"?>
-<p:sld xmlns:a="http://schemas.openxmlformats.org/drawingml/2006/main" xmlns:r="http://schemas.openxmlformats.org/officeDocument/2006/relationships" xmlns:p="http://schemas.openxmlformats.org/presentationml/2006/main">
+<p:sld xmlns:a="http://schemas.openxmlformats.org/drawingml/2006/main" xmlns:ns2="http://schemas.microsoft.com/office/drawing/2014/main" xmlns:ns4="http://schemas.microsoft.com/office/powerpoint/2010/main" xmlns:p="http://schemas.openxmlformats.org/presentationml/2006/main" xmlns:r="http://schemas.openxmlformats.org/officeDocument/2006/relationships">
   <p:cSld>
     <p:spTree>
       <p:nvGrpSpPr>
@@ -9068,7 +9068,7 @@
           <p:cNvPr id="4" name="TextBox 3">
             <a:extLst>
               <a:ext uri="{FF2B5EF4-FFF2-40B4-BE49-F238E27FC236}">
-                <a16:creationId xmlns:a16="http://schemas.microsoft.com/office/drawing/2014/main" id="{A6E9E3DA-DF54-E095-FBBE-2A0236324D85}"/>
+                <ns2:creationId id="{A6E9E3DA-DF54-E095-FBBE-2A0236324D85}"/>
               </a:ext>
             </a:extLst>
           </p:cNvPr>
@@ -9103,7 +9103,7 @@
           <p:cNvPr id="5" name="Picture 4">
             <a:extLst>
               <a:ext uri="{FF2B5EF4-FFF2-40B4-BE49-F238E27FC236}">
-                <a16:creationId xmlns:a16="http://schemas.microsoft.com/office/drawing/2014/main" id="{D77E8084-842A-D07E-0DC8-284C3867A312}"/>
+                <ns2:creationId id="{D77E8084-842A-D07E-0DC8-284C3867A312}"/>
               </a:ext>
             </a:extLst>
           </p:cNvPr>
@@ -9133,7 +9133,7 @@
           <p:cNvPr id="6" name="Picture 5">
             <a:extLst>
               <a:ext uri="{FF2B5EF4-FFF2-40B4-BE49-F238E27FC236}">
-                <a16:creationId xmlns:a16="http://schemas.microsoft.com/office/drawing/2014/main" id="{83F46165-E8A3-C9F3-53D6-A855E60DA05C}"/>
+                <ns2:creationId id="{83F46165-E8A3-C9F3-53D6-A855E60DA05C}"/>
               </a:ext>
             </a:extLst>
           </p:cNvPr>
@@ -9163,7 +9163,7 @@
           <p:cNvPr id="7" name="Picture 6">
             <a:extLst>
               <a:ext uri="{FF2B5EF4-FFF2-40B4-BE49-F238E27FC236}">
-                <a16:creationId xmlns:a16="http://schemas.microsoft.com/office/drawing/2014/main" id="{DCE0D971-A603-0C01-0248-CCB318484FC0}"/>
+                <ns2:creationId id="{DCE0D971-A603-0C01-0248-CCB318484FC0}"/>
               </a:ext>
             </a:extLst>
           </p:cNvPr>
@@ -9190,7 +9190,7 @@
     </p:spTree>
     <p:extLst>
       <p:ext uri="{BB962C8B-B14F-4D97-AF65-F5344CB8AC3E}">
-        <p14:creationId xmlns:p14="http://schemas.microsoft.com/office/powerpoint/2010/main" val="4222490217"/>
+        <ns4:creationId val="4222490217"/>
       </p:ext>
     </p:extLst>
   </p:cSld>
@@ -9201,7 +9201,7 @@
 </file>
 
 <file path=ppt/slides/slide15.xml><?xml version="1.0" encoding="utf-8"?>
-<p:sld xmlns:a="http://schemas.openxmlformats.org/drawingml/2006/main" xmlns:r="http://schemas.openxmlformats.org/officeDocument/2006/relationships" xmlns:p="http://schemas.openxmlformats.org/presentationml/2006/main">
+<p:sld xmlns:a="http://schemas.openxmlformats.org/drawingml/2006/main" xmlns:ns2="http://schemas.microsoft.com/office/drawing/2014/main" xmlns:ns4="http://schemas.microsoft.com/office/powerpoint/2010/main" xmlns:p="http://schemas.openxmlformats.org/presentationml/2006/main" xmlns:r="http://schemas.openxmlformats.org/officeDocument/2006/relationships">
   <p:cSld>
     <p:spTree>
       <p:nvGrpSpPr>
@@ -9222,7 +9222,7 @@
           <p:cNvPr id="4" name="Picture 3">
             <a:extLst>
               <a:ext uri="{FF2B5EF4-FFF2-40B4-BE49-F238E27FC236}">
-                <a16:creationId xmlns:a16="http://schemas.microsoft.com/office/drawing/2014/main" id="{C42BF500-5BA5-FC61-398A-3D13981AC698}"/>
+                <ns2:creationId id="{C42BF500-5BA5-FC61-398A-3D13981AC698}"/>
               </a:ext>
             </a:extLst>
           </p:cNvPr>
@@ -9251,7 +9251,7 @@
           <p:cNvPr id="5" name="TextBox 4">
             <a:extLst>
               <a:ext uri="{FF2B5EF4-FFF2-40B4-BE49-F238E27FC236}">
-                <a16:creationId xmlns:a16="http://schemas.microsoft.com/office/drawing/2014/main" id="{45C25413-1EED-3E21-0C90-26900352DA9A}"/>
+                <ns2:creationId id="{45C25413-1EED-3E21-0C90-26900352DA9A}"/>
               </a:ext>
             </a:extLst>
           </p:cNvPr>
@@ -9308,7 +9308,7 @@
           <p:cNvPr id="6" name="TextBox 5">
             <a:extLst>
               <a:ext uri="{FF2B5EF4-FFF2-40B4-BE49-F238E27FC236}">
-                <a16:creationId xmlns:a16="http://schemas.microsoft.com/office/drawing/2014/main" id="{9F77BF6E-ACDB-5877-CD59-FEEADB429886}"/>
+                <ns2:creationId id="{9F77BF6E-ACDB-5877-CD59-FEEADB429886}"/>
               </a:ext>
             </a:extLst>
           </p:cNvPr>
@@ -9336,7 +9336,7 @@
                 <a:latin typeface="Times New Roman" panose="02020603050405020304" pitchFamily="18" charset="0"/>
                 <a:cs typeface="Times New Roman" panose="02020603050405020304" pitchFamily="18" charset="0"/>
               </a:rPr>
-              <a:t>Steps: </a:t>
+              <a:t>Steps:</a:t>
             </a:r>
           </a:p>
           <a:p>
@@ -9362,7 +9362,7 @@
                 <a:latin typeface="Times New Roman" panose="02020603050405020304" pitchFamily="18" charset="0"/>
                 <a:cs typeface="Times New Roman" panose="02020603050405020304" pitchFamily="18" charset="0"/>
               </a:rPr>
-              <a:t>Data Normalization </a:t>
+              <a:t>Data Normalization</a:t>
             </a:r>
           </a:p>
           <a:p>
@@ -9411,7 +9411,7 @@
           <p:cNvPr id="7" name="Table 6">
             <a:extLst>
               <a:ext uri="{FF2B5EF4-FFF2-40B4-BE49-F238E27FC236}">
-                <a16:creationId xmlns:a16="http://schemas.microsoft.com/office/drawing/2014/main" id="{6D293ED9-BD53-808A-32FD-31250D579284}"/>
+                <ns2:creationId id="{6D293ED9-BD53-808A-32FD-31250D579284}"/>
               </a:ext>
             </a:extLst>
           </p:cNvPr>
@@ -9421,7 +9421,7 @@
           <p:nvPr>
             <p:extLst>
               <p:ext uri="{D42A27DB-BD31-4B8C-83A1-F6EECF244321}">
-                <p14:modId xmlns:p14="http://schemas.microsoft.com/office/powerpoint/2010/main" val="2949774128"/>
+                <ns4:modId val="2949774128"/>
               </p:ext>
             </p:extLst>
           </p:nvPr>
@@ -9440,35 +9440,35 @@
                 <a:gridCol w="1625600">
                   <a:extLst>
                     <a:ext uri="{9D8B030D-6E8A-4147-A177-3AD203B41FA5}">
-                      <a16:colId xmlns:a16="http://schemas.microsoft.com/office/drawing/2014/main" val="1479171188"/>
+                      <ns2:colId val="1479171188"/>
                     </a:ext>
                   </a:extLst>
                 </a:gridCol>
                 <a:gridCol w="1625600">
                   <a:extLst>
                     <a:ext uri="{9D8B030D-6E8A-4147-A177-3AD203B41FA5}">
-                      <a16:colId xmlns:a16="http://schemas.microsoft.com/office/drawing/2014/main" val="2868419691"/>
+                      <ns2:colId val="2868419691"/>
                     </a:ext>
                   </a:extLst>
                 </a:gridCol>
                 <a:gridCol w="1625600">
                   <a:extLst>
                     <a:ext uri="{9D8B030D-6E8A-4147-A177-3AD203B41FA5}">
-                      <a16:colId xmlns:a16="http://schemas.microsoft.com/office/drawing/2014/main" val="2636563834"/>
+                      <ns2:colId val="2636563834"/>
                     </a:ext>
                   </a:extLst>
                 </a:gridCol>
                 <a:gridCol w="1625600">
                   <a:extLst>
                     <a:ext uri="{9D8B030D-6E8A-4147-A177-3AD203B41FA5}">
-                      <a16:colId xmlns:a16="http://schemas.microsoft.com/office/drawing/2014/main" val="535304470"/>
+                      <ns2:colId val="535304470"/>
                     </a:ext>
                   </a:extLst>
                 </a:gridCol>
                 <a:gridCol w="1625600">
                   <a:extLst>
                     <a:ext uri="{9D8B030D-6E8A-4147-A177-3AD203B41FA5}">
-                      <a16:colId xmlns:a16="http://schemas.microsoft.com/office/drawing/2014/main" val="2054876321"/>
+                      <ns2:colId val="2054876321"/>
                     </a:ext>
                   </a:extLst>
                 </a:gridCol>
@@ -9541,7 +9541,7 @@
                 </a:tc>
                 <a:extLst>
                   <a:ext uri="{0D108BD9-81ED-4DB2-BD59-A6C34878D82A}">
-                    <a16:rowId xmlns:a16="http://schemas.microsoft.com/office/drawing/2014/main" val="1933556531"/>
+                    <ns2:rowId val="1933556531"/>
                   </a:ext>
                 </a:extLst>
               </a:tr>
@@ -9613,7 +9613,7 @@
                 </a:tc>
                 <a:extLst>
                   <a:ext uri="{0D108BD9-81ED-4DB2-BD59-A6C34878D82A}">
-                    <a16:rowId xmlns:a16="http://schemas.microsoft.com/office/drawing/2014/main" val="2821029615"/>
+                    <ns2:rowId val="2821029615"/>
                   </a:ext>
                 </a:extLst>
               </a:tr>
@@ -9685,7 +9685,7 @@
                 </a:tc>
                 <a:extLst>
                   <a:ext uri="{0D108BD9-81ED-4DB2-BD59-A6C34878D82A}">
-                    <a16:rowId xmlns:a16="http://schemas.microsoft.com/office/drawing/2014/main" val="3038086510"/>
+                    <ns2:rowId val="3038086510"/>
                   </a:ext>
                 </a:extLst>
               </a:tr>
@@ -9757,7 +9757,7 @@
                 </a:tc>
                 <a:extLst>
                   <a:ext uri="{0D108BD9-81ED-4DB2-BD59-A6C34878D82A}">
-                    <a16:rowId xmlns:a16="http://schemas.microsoft.com/office/drawing/2014/main" val="1930978888"/>
+                    <ns2:rowId val="1930978888"/>
                   </a:ext>
                 </a:extLst>
               </a:tr>
@@ -9829,7 +9829,7 @@
                 </a:tc>
                 <a:extLst>
                   <a:ext uri="{0D108BD9-81ED-4DB2-BD59-A6C34878D82A}">
-                    <a16:rowId xmlns:a16="http://schemas.microsoft.com/office/drawing/2014/main" val="1170288211"/>
+                    <ns2:rowId val="1170288211"/>
                   </a:ext>
                 </a:extLst>
               </a:tr>
@@ -9901,7 +9901,7 @@
                 </a:tc>
                 <a:extLst>
                   <a:ext uri="{0D108BD9-81ED-4DB2-BD59-A6C34878D82A}">
-                    <a16:rowId xmlns:a16="http://schemas.microsoft.com/office/drawing/2014/main" val="3620246437"/>
+                    <ns2:rowId val="3620246437"/>
                   </a:ext>
                 </a:extLst>
               </a:tr>
@@ -9973,7 +9973,7 @@
                 </a:tc>
                 <a:extLst>
                   <a:ext uri="{0D108BD9-81ED-4DB2-BD59-A6C34878D82A}">
-                    <a16:rowId xmlns:a16="http://schemas.microsoft.com/office/drawing/2014/main" val="2577520662"/>
+                    <ns2:rowId val="2577520662"/>
                   </a:ext>
                 </a:extLst>
               </a:tr>
@@ -9984,7 +9984,7 @@
     </p:spTree>
     <p:extLst>
       <p:ext uri="{BB962C8B-B14F-4D97-AF65-F5344CB8AC3E}">
-        <p14:creationId xmlns:p14="http://schemas.microsoft.com/office/powerpoint/2010/main" val="600373833"/>
+        <ns4:creationId val="600373833"/>
       </p:ext>
     </p:extLst>
   </p:cSld>
@@ -9995,7 +9995,7 @@
 </file>
 
 <file path=ppt/slides/slide16.xml><?xml version="1.0" encoding="utf-8"?>
-<p:sld xmlns:a="http://schemas.openxmlformats.org/drawingml/2006/main" xmlns:r="http://schemas.openxmlformats.org/officeDocument/2006/relationships" xmlns:p="http://schemas.openxmlformats.org/presentationml/2006/main">
+<p:sld xmlns:a="http://schemas.openxmlformats.org/drawingml/2006/main" xmlns:ns2="http://schemas.microsoft.com/office/drawing/2014/main" xmlns:ns4="http://schemas.microsoft.com/office/powerpoint/2010/main" xmlns:p="http://schemas.openxmlformats.org/presentationml/2006/main" xmlns:r="http://schemas.openxmlformats.org/officeDocument/2006/relationships">
   <p:cSld>
     <p:spTree>
       <p:nvGrpSpPr>
@@ -10016,7 +10016,7 @@
           <p:cNvPr id="4" name="TextBox 4">
             <a:extLst>
               <a:ext uri="{FF2B5EF4-FFF2-40B4-BE49-F238E27FC236}">
-                <a16:creationId xmlns:a16="http://schemas.microsoft.com/office/drawing/2014/main" id="{72F762D2-6BDF-611B-9F79-4B74D916BE20}"/>
+                <ns2:creationId id="{72F762D2-6BDF-611B-9F79-4B74D916BE20}"/>
               </a:ext>
             </a:extLst>
           </p:cNvPr>
@@ -10073,7 +10073,7 @@
           <p:cNvPr id="5" name="TextBox 5">
             <a:extLst>
               <a:ext uri="{FF2B5EF4-FFF2-40B4-BE49-F238E27FC236}">
-                <a16:creationId xmlns:a16="http://schemas.microsoft.com/office/drawing/2014/main" id="{780CC862-B83B-FA8F-694C-72B116EBE044}"/>
+                <ns2:creationId id="{780CC862-B83B-FA8F-694C-72B116EBE044}"/>
               </a:ext>
             </a:extLst>
           </p:cNvPr>
@@ -10129,7 +10129,7 @@
                 <a:latin typeface="Times New Roman" panose="02020603050405020304" pitchFamily="18" charset="0"/>
                 <a:cs typeface="Times New Roman" panose="02020603050405020304" pitchFamily="18" charset="0"/>
               </a:rPr>
-              <a:t>Model Optimization </a:t>
+              <a:t>Model Optimization</a:t>
             </a:r>
           </a:p>
           <a:p>
@@ -10148,7 +10148,7 @@
                 <a:latin typeface="Times New Roman" panose="02020603050405020304" pitchFamily="18" charset="0"/>
                 <a:cs typeface="Times New Roman" panose="02020603050405020304" pitchFamily="18" charset="0"/>
               </a:rPr>
-              <a:t>Hyperparameter Optimization </a:t>
+              <a:t>Hyperparameter Optimization</a:t>
             </a:r>
           </a:p>
           <a:p>
@@ -10203,7 +10203,7 @@
                 <a:latin typeface="Times New Roman" panose="02020603050405020304" pitchFamily="18" charset="0"/>
                 <a:cs typeface="Times New Roman" panose="02020603050405020304" pitchFamily="18" charset="0"/>
               </a:rPr>
-              <a:t>Cross-Validation </a:t>
+              <a:t>Cross-Validation</a:t>
             </a:r>
           </a:p>
           <a:p>
@@ -10285,7 +10285,7 @@
                 <a:latin typeface="Times New Roman" panose="02020603050405020304" pitchFamily="18" charset="0"/>
                 <a:cs typeface="Times New Roman" panose="02020603050405020304" pitchFamily="18" charset="0"/>
               </a:rPr>
-              <a:t> Model Interpretation </a:t>
+              <a:t>Model Interpretation</a:t>
             </a:r>
           </a:p>
           <a:p>
@@ -10333,7 +10333,7 @@
           <p:cNvPr id="6" name="Picture 5">
             <a:extLst>
               <a:ext uri="{FF2B5EF4-FFF2-40B4-BE49-F238E27FC236}">
-                <a16:creationId xmlns:a16="http://schemas.microsoft.com/office/drawing/2014/main" id="{6041E8C0-1DE7-56AE-84E3-8C2AB15FF92E}"/>
+                <ns2:creationId id="{6041E8C0-1DE7-56AE-84E3-8C2AB15FF92E}"/>
               </a:ext>
             </a:extLst>
           </p:cNvPr>
@@ -10360,7 +10360,7 @@
     </p:spTree>
     <p:extLst>
       <p:ext uri="{BB962C8B-B14F-4D97-AF65-F5344CB8AC3E}">
-        <p14:creationId xmlns:p14="http://schemas.microsoft.com/office/powerpoint/2010/main" val="1161654779"/>
+        <ns4:creationId val="1161654779"/>
       </p:ext>
     </p:extLst>
   </p:cSld>
@@ -10371,7 +10371,7 @@
 </file>
 
 <file path=ppt/slides/slide2.xml><?xml version="1.0" encoding="utf-8"?>
-<p:sld xmlns:a="http://schemas.openxmlformats.org/drawingml/2006/main" xmlns:r="http://schemas.openxmlformats.org/officeDocument/2006/relationships" xmlns:p="http://schemas.openxmlformats.org/presentationml/2006/main">
+<p:sld xmlns:a="http://schemas.openxmlformats.org/drawingml/2006/main" xmlns:p="http://schemas.openxmlformats.org/presentationml/2006/main" xmlns:r="http://schemas.openxmlformats.org/officeDocument/2006/relationships">
   <p:cSld>
     <p:spTree>
       <p:nvGrpSpPr>
@@ -10524,7 +10524,7 @@
                 </a:solidFill>
                 <a:latin typeface="Times New Roman"/>
               </a:rPr>
-              <a:t>What is Heart Failure? </a:t>
+              <a:t>What is Heart Failure?</a:t>
             </a:r>
             <a:endParaRPr lang="en-US" sz="1800" b="0" strike="noStrike" spc="-1" dirty="0">
               <a:solidFill>
@@ -10578,7 +10578,7 @@
                 </a:solidFill>
                 <a:latin typeface="Times New Roman"/>
               </a:rPr>
-              <a:t>Not all heart failures lead to death. </a:t>
+              <a:t>Not all heart failures lead to death.</a:t>
             </a:r>
             <a:endParaRPr lang="en-US" sz="1800" b="0" strike="noStrike" spc="-1" dirty="0">
               <a:solidFill>
@@ -10605,7 +10605,7 @@
                 </a:solidFill>
                 <a:latin typeface="Times New Roman"/>
               </a:rPr>
-              <a:t>2 types of heart failure: </a:t>
+              <a:t>Two types of heart failure:</a:t>
             </a:r>
             <a:endParaRPr lang="en-US" sz="1800" b="0" strike="noStrike" spc="-1" dirty="0">
               <a:solidFill>
@@ -10659,7 +10659,7 @@
                 </a:solidFill>
                 <a:latin typeface="Times New Roman"/>
               </a:rPr>
-              <a:t>Preserved ejection fraction (left ventricle is stiff and cannot relax and fill properly) </a:t>
+              <a:t>Preserved ejection fraction (left ventricle is stiff and cannot relax and fill properly)</a:t>
             </a:r>
             <a:endParaRPr lang="en-US" sz="1800" b="0" strike="noStrike" spc="-1" dirty="0">
               <a:solidFill>
@@ -10699,7 +10699,7 @@
                 </a:solidFill>
                 <a:latin typeface="Times New Roman"/>
               </a:rPr>
-              <a:t>Goal: </a:t>
+              <a:t>Goal:</a:t>
             </a:r>
             <a:endParaRPr lang="en-US" sz="1800" b="0" strike="noStrike" spc="-1" dirty="0">
               <a:solidFill>
@@ -10721,7 +10721,7 @@
                 </a:solidFill>
                 <a:latin typeface="Times New Roman"/>
               </a:rPr>
-              <a:t>	</a:t>
+              <a:t/>
             </a:r>
             <a:r>
               <a:rPr lang="en-US" sz="1800" b="0" strike="noStrike" spc="-1" dirty="0">
@@ -10752,7 +10752,7 @@
                 </a:solidFill>
                 <a:latin typeface="Times New Roman"/>
               </a:rPr>
-              <a:t>	b) Identify the most critical parameters affecting survival </a:t>
+              <a:t>b) Identify the most critical parameters affecting survival</a:t>
             </a:r>
             <a:r>
               <a:rPr lang="en-US" sz="1800" b="0" strike="noStrike" spc="-1" dirty="0">
@@ -10770,7 +10770,7 @@
                 </a:solidFill>
                 <a:latin typeface="Times New Roman"/>
               </a:rPr>
-              <a:t> provide insights to physicians to tailor treatments more effectively and reduce mortality</a:t>
+              <a:t>provide insights to physicians to tailor treatments more effectively and reduce mortality</a:t>
             </a:r>
             <a:endParaRPr lang="en-US" sz="1800" b="0" strike="noStrike" spc="-1" dirty="0">
               <a:solidFill>
@@ -10895,7 +10895,7 @@
 </file>
 
 <file path=ppt/slides/slide3.xml><?xml version="1.0" encoding="utf-8"?>
-<p:sld xmlns:a="http://schemas.openxmlformats.org/drawingml/2006/main" xmlns:r="http://schemas.openxmlformats.org/officeDocument/2006/relationships" xmlns:p="http://schemas.openxmlformats.org/presentationml/2006/main">
+<p:sld xmlns:a="http://schemas.openxmlformats.org/drawingml/2006/main" xmlns:ns3="http://schemas.microsoft.com/office/drawing/2014/main" xmlns:p="http://schemas.openxmlformats.org/presentationml/2006/main" xmlns:r="http://schemas.openxmlformats.org/officeDocument/2006/relationships">
   <p:cSld>
     <p:spTree>
       <p:nvGrpSpPr>
@@ -11049,7 +11049,7 @@
                 <a:latin typeface="Times New Roman" panose="02020603050405020304" pitchFamily="18" charset="0"/>
                 <a:cs typeface="Times New Roman" panose="02020603050405020304" pitchFamily="18" charset="0"/>
               </a:rPr>
-              <a:t>299 heart failure patients with PEF</a:t>
+              <a:t>Dataset: 299 heart failure patients</a:t>
             </a:r>
           </a:p>
           <a:p>
@@ -11071,7 +11071,7 @@
                 <a:latin typeface="Times New Roman" panose="02020603050405020304" pitchFamily="18" charset="0"/>
                 <a:cs typeface="Times New Roman" panose="02020603050405020304" pitchFamily="18" charset="0"/>
               </a:rPr>
-              <a:t>Features (demographic, lifestyle factors, critical health indicators) </a:t>
+              <a:t>Features: Demographic, lifestyle factors, and critical health indicators</a:t>
             </a:r>
             <a:r>
               <a:rPr lang="en-US" sz="2000" b="0" strike="noStrike" spc="-1" dirty="0">
@@ -11082,7 +11082,7 @@
                 <a:cs typeface="Times New Roman" panose="02020603050405020304" pitchFamily="18" charset="0"/>
                 <a:sym typeface="Wingdings" pitchFamily="2" charset="2"/>
               </a:rPr>
-              <a:t> Binary and Continuous</a:t>
+              <a:t> Both Binary and Continuous variables</a:t>
             </a:r>
             <a:endParaRPr lang="en-US" sz="2000" b="0" strike="noStrike" spc="-1" dirty="0">
               <a:solidFill>
@@ -11111,7 +11111,7 @@
                 <a:latin typeface="Times New Roman" panose="02020603050405020304" pitchFamily="18" charset="0"/>
                 <a:cs typeface="Times New Roman" panose="02020603050405020304" pitchFamily="18" charset="0"/>
               </a:rPr>
-              <a:t>Target feature: “death event” tracks patient survival in 130 days </a:t>
+              <a:t>Target feature: “death event” tracks patient survival in 130 days</a:t>
             </a:r>
           </a:p>
         </p:txBody>
@@ -11134,14 +11134,14 @@
                 <a:gridCol w="4063680">
                   <a:extLst>
                     <a:ext uri="{9D8B030D-6E8A-4147-A177-3AD203B41FA5}">
-                      <a16:colId xmlns:a16="http://schemas.microsoft.com/office/drawing/2014/main" val="20000"/>
+                      <ns3:colId val="20000"/>
                     </a:ext>
                   </a:extLst>
                 </a:gridCol>
                 <a:gridCol w="4063680">
                   <a:extLst>
                     <a:ext uri="{9D8B030D-6E8A-4147-A177-3AD203B41FA5}">
-                      <a16:colId xmlns:a16="http://schemas.microsoft.com/office/drawing/2014/main" val="20001"/>
+                      <ns3:colId val="20001"/>
                     </a:ext>
                   </a:extLst>
                 </a:gridCol>
@@ -11255,7 +11255,7 @@
                 </a:tc>
                 <a:extLst>
                   <a:ext uri="{0D108BD9-81ED-4DB2-BD59-A6C34878D82A}">
-                    <a16:rowId xmlns:a16="http://schemas.microsoft.com/office/drawing/2014/main" val="10000"/>
+                    <ns3:rowId val="10000"/>
                   </a:ext>
                 </a:extLst>
               </a:tr>
@@ -11376,7 +11376,7 @@
                 </a:tc>
                 <a:extLst>
                   <a:ext uri="{0D108BD9-81ED-4DB2-BD59-A6C34878D82A}">
-                    <a16:rowId xmlns:a16="http://schemas.microsoft.com/office/drawing/2014/main" val="10001"/>
+                    <ns3:rowId val="10001"/>
                   </a:ext>
                 </a:extLst>
               </a:tr>
@@ -11393,7 +11393,7 @@
 </file>
 
 <file path=ppt/slides/slide4.xml><?xml version="1.0" encoding="utf-8"?>
-<p:sld xmlns:a="http://schemas.openxmlformats.org/drawingml/2006/main" xmlns:r="http://schemas.openxmlformats.org/officeDocument/2006/relationships" xmlns:p="http://schemas.openxmlformats.org/presentationml/2006/main" show="0">
+<p:sld xmlns:a="http://schemas.openxmlformats.org/drawingml/2006/main" xmlns:ns2="http://schemas.microsoft.com/office/drawing/2014/main" xmlns:ns3="http://schemas.microsoft.com/office/powerpoint/2010/main" xmlns:p="http://schemas.openxmlformats.org/presentationml/2006/main" show="0">
   <p:cSld>
     <p:spTree>
       <p:nvGrpSpPr>
@@ -11414,7 +11414,7 @@
           <p:cNvPr id="4" name="TextBox 4">
             <a:extLst>
               <a:ext uri="{FF2B5EF4-FFF2-40B4-BE49-F238E27FC236}">
-                <a16:creationId xmlns:a16="http://schemas.microsoft.com/office/drawing/2014/main" id="{BBC964ED-A24E-60C6-667F-DED39A165BAD}"/>
+                <ns2:creationId id="{BBC964ED-A24E-60C6-667F-DED39A165BAD}"/>
               </a:ext>
             </a:extLst>
           </p:cNvPr>
@@ -11480,7 +11480,7 @@
           <p:cNvPr id="5" name="TextBox 5">
             <a:extLst>
               <a:ext uri="{FF2B5EF4-FFF2-40B4-BE49-F238E27FC236}">
-                <a16:creationId xmlns:a16="http://schemas.microsoft.com/office/drawing/2014/main" id="{791268D2-06CB-7B2B-BBD5-06EBE38B9DFD}"/>
+                <ns2:creationId id="{791268D2-06CB-7B2B-BBD5-06EBE38B9DFD}"/>
               </a:ext>
             </a:extLst>
           </p:cNvPr>
@@ -11536,7 +11536,7 @@
                 <a:latin typeface="Times New Roman" panose="02020603050405020304" pitchFamily="18" charset="0"/>
                 <a:cs typeface="Times New Roman" panose="02020603050405020304" pitchFamily="18" charset="0"/>
               </a:rPr>
-              <a:t>Anaemia</a:t>
+              <a:t>Anemia</a:t>
             </a:r>
             <a:r>
               <a:rPr lang="en-US" sz="1800" b="0" strike="noStrike" spc="-1" dirty="0">
@@ -11546,7 +11546,7 @@
                 <a:latin typeface="Times New Roman" panose="02020603050405020304" pitchFamily="18" charset="0"/>
                 <a:cs typeface="Times New Roman" panose="02020603050405020304" pitchFamily="18" charset="0"/>
               </a:rPr>
-              <a:t>: Deficiency of red blood cells (&lt;36%). Yes: 1, No: 0</a:t>
+              <a:t>- Deficiency of red blood cells (&lt;36%)</a:t>
             </a:r>
           </a:p>
           <a:p>
@@ -11578,7 +11578,7 @@
                 <a:latin typeface="Times New Roman" panose="02020603050405020304" pitchFamily="18" charset="0"/>
                 <a:cs typeface="Times New Roman" panose="02020603050405020304" pitchFamily="18" charset="0"/>
               </a:rPr>
-              <a:t> Enzyme: When a muscle tissue gets damaged, CPK flows into the blood. High levels might indicate heart failure or injury.</a:t>
+              <a:t>Enzyme levels that increase when muscle tissue is damaged. High levels may indicate heart failure or injury.</a:t>
             </a:r>
           </a:p>
           <a:p>
@@ -11610,14 +11610,14 @@
                 <a:latin typeface="Times New Roman" panose="02020603050405020304" pitchFamily="18" charset="0"/>
                 <a:cs typeface="Times New Roman" panose="02020603050405020304" pitchFamily="18" charset="0"/>
               </a:rPr>
-              <a:t>: </a:t>
+              <a:t>:</a:t>
             </a:r>
             <a:r>
               <a:rPr lang="en-US" dirty="0">
                 <a:latin typeface="Times New Roman" panose="02020603050405020304" pitchFamily="18" charset="0"/>
                 <a:cs typeface="Times New Roman" panose="02020603050405020304" pitchFamily="18" charset="0"/>
               </a:rPr>
-              <a:t>states the percentage of how much blood the left ventricle pumps out with each contraction. </a:t>
+              <a:t>states the percentage of how much blood the left ventricle pumps out with each contraction.</a:t>
             </a:r>
           </a:p>
           <a:p>
@@ -11649,7 +11649,7 @@
                 <a:latin typeface="Times New Roman" panose="02020603050405020304" pitchFamily="18" charset="0"/>
                 <a:cs typeface="Times New Roman" panose="02020603050405020304" pitchFamily="18" charset="0"/>
               </a:rPr>
-              <a:t>: </a:t>
+              <a:t>:</a:t>
             </a:r>
             <a:r>
               <a:rPr lang="en-US" dirty="0">
@@ -11688,14 +11688,14 @@
                 <a:latin typeface="Times New Roman" panose="02020603050405020304" pitchFamily="18" charset="0"/>
                 <a:cs typeface="Times New Roman" panose="02020603050405020304" pitchFamily="18" charset="0"/>
               </a:rPr>
-              <a:t>: </a:t>
+              <a:t>:</a:t>
             </a:r>
             <a:r>
               <a:rPr lang="en-US" dirty="0">
                 <a:latin typeface="Times New Roman" panose="02020603050405020304" pitchFamily="18" charset="0"/>
                 <a:cs typeface="Times New Roman" panose="02020603050405020304" pitchFamily="18" charset="0"/>
               </a:rPr>
-              <a:t>a mineral that serves for the correct functioning of muscles and nerves. The serum sodium test is a routine blood exam that indicates if a patient has normal levels of sodium in the blood. An abnormally low level of sodium in the blood might be caused by heart failure. </a:t>
+              <a:t>a mineral that serves for the correct functioning of muscles and nerves. The serum sodium test is a routine blood exam that indicates if a patient has normal levels of sodium in the blood. An abnormally low level of sodium in the blood might be caused by heart failure.</a:t>
             </a:r>
           </a:p>
           <a:p>
@@ -11727,7 +11727,7 @@
                 <a:latin typeface="Times New Roman" panose="02020603050405020304" pitchFamily="18" charset="0"/>
                 <a:cs typeface="Times New Roman" panose="02020603050405020304" pitchFamily="18" charset="0"/>
               </a:rPr>
-              <a:t>: age of the patient </a:t>
+              <a:t>: age of the patient</a:t>
             </a:r>
           </a:p>
           <a:p>
@@ -11759,7 +11759,7 @@
                 <a:latin typeface="Times New Roman" panose="02020603050405020304" pitchFamily="18" charset="0"/>
                 <a:cs typeface="Times New Roman" panose="02020603050405020304" pitchFamily="18" charset="0"/>
               </a:rPr>
-              <a:t>: woman (0) or man (1) </a:t>
+              <a:t>: woman (0) or man (1)</a:t>
             </a:r>
           </a:p>
           <a:p>
@@ -11843,7 +11843,7 @@
                 <a:latin typeface="Times New Roman" panose="02020603050405020304" pitchFamily="18" charset="0"/>
                 <a:cs typeface="Times New Roman" panose="02020603050405020304" pitchFamily="18" charset="0"/>
               </a:rPr>
-              <a:t>: if the patient smokes (1), if not (0) </a:t>
+              <a:t>: if the patient smokes (1), if not (0)</a:t>
             </a:r>
           </a:p>
           <a:p>
@@ -11875,7 +11875,7 @@
                 <a:latin typeface="Times New Roman" panose="02020603050405020304" pitchFamily="18" charset="0"/>
                 <a:cs typeface="Times New Roman" panose="02020603050405020304" pitchFamily="18" charset="0"/>
               </a:rPr>
-              <a:t>: number of platelets in the blood </a:t>
+              <a:t>: number of platelets in the blood</a:t>
             </a:r>
           </a:p>
           <a:p>
@@ -11907,7 +11907,7 @@
                 <a:latin typeface="Times New Roman" panose="02020603050405020304" pitchFamily="18" charset="0"/>
                 <a:cs typeface="Times New Roman" panose="02020603050405020304" pitchFamily="18" charset="0"/>
               </a:rPr>
-              <a:t>: Yes (1), no (0) </a:t>
+              <a:t>: Yes (1), no (0)</a:t>
             </a:r>
           </a:p>
           <a:p>
@@ -11950,7 +11950,7 @@
                 <a:cs typeface="Times New Roman" panose="02020603050405020304" pitchFamily="18" charset="0"/>
                 <a:sym typeface="Wingdings" pitchFamily="2" charset="2"/>
               </a:rPr>
-              <a:t> (1), no (0) </a:t>
+              <a:t>(1), no (0)</a:t>
             </a:r>
             <a:endParaRPr lang="en-US" sz="1800" b="0" strike="noStrike" spc="-1" dirty="0">
               <a:solidFill>
@@ -11965,7 +11965,7 @@
     </p:spTree>
     <p:extLst>
       <p:ext uri="{BB962C8B-B14F-4D97-AF65-F5344CB8AC3E}">
-        <p14:creationId xmlns:p14="http://schemas.microsoft.com/office/powerpoint/2010/main" val="411383060"/>
+        <ns3:creationId val="411383060"/>
       </p:ext>
     </p:extLst>
   </p:cSld>
@@ -11976,7 +11976,7 @@
 </file>
 
 <file path=ppt/slides/slide5.xml><?xml version="1.0" encoding="utf-8"?>
-<p:sld xmlns:a="http://schemas.openxmlformats.org/drawingml/2006/main" xmlns:r="http://schemas.openxmlformats.org/officeDocument/2006/relationships" xmlns:p="http://schemas.openxmlformats.org/presentationml/2006/main">
+<p:sld xmlns:a="http://schemas.openxmlformats.org/drawingml/2006/main" xmlns:ns2="http://schemas.microsoft.com/office/drawing/2014/main" xmlns:ns4="http://schemas.microsoft.com/office/drawing/2010/main" xmlns:ns5="http://schemas.microsoft.com/office/powerpoint/2010/main" xmlns:p="http://schemas.openxmlformats.org/presentationml/2006/main" xmlns:r="http://schemas.openxmlformats.org/officeDocument/2006/relationships">
   <p:cSld>
     <p:spTree>
       <p:nvGrpSpPr>
@@ -11997,7 +11997,7 @@
           <p:cNvPr id="4" name="TextBox 4">
             <a:extLst>
               <a:ext uri="{FF2B5EF4-FFF2-40B4-BE49-F238E27FC236}">
-                <a16:creationId xmlns:a16="http://schemas.microsoft.com/office/drawing/2014/main" id="{737AA316-9D85-C268-A696-D86634B7E183}"/>
+                <ns2:creationId id="{737AA316-9D85-C268-A696-D86634B7E183}"/>
               </a:ext>
             </a:extLst>
           </p:cNvPr>
@@ -12063,7 +12063,7 @@
           <p:cNvPr id="6" name="Picture 5" descr="A screenshot of a medical report&#10;&#10;AI-generated content may be incorrect.">
             <a:extLst>
               <a:ext uri="{FF2B5EF4-FFF2-40B4-BE49-F238E27FC236}">
-                <a16:creationId xmlns:a16="http://schemas.microsoft.com/office/drawing/2014/main" id="{40D53318-27AE-F7F9-889F-5E0F6EAE1666}"/>
+                <ns2:creationId id="{40D53318-27AE-F7F9-889F-5E0F6EAE1666}"/>
               </a:ext>
             </a:extLst>
           </p:cNvPr>
@@ -12076,7 +12076,7 @@
           <a:blip r:embed="rId2">
             <a:extLst>
               <a:ext uri="{28A0092B-C50C-407E-A947-70E740481C1C}">
-                <a14:useLocalDpi xmlns:a14="http://schemas.microsoft.com/office/drawing/2010/main" val="0"/>
+                <ns4:useLocalDpi val="0"/>
               </a:ext>
             </a:extLst>
           </a:blip>
@@ -12097,7 +12097,7 @@
     </p:spTree>
     <p:extLst>
       <p:ext uri="{BB962C8B-B14F-4D97-AF65-F5344CB8AC3E}">
-        <p14:creationId xmlns:p14="http://schemas.microsoft.com/office/powerpoint/2010/main" val="2192079620"/>
+        <ns5:creationId val="2192079620"/>
       </p:ext>
     </p:extLst>
   </p:cSld>
@@ -12108,7 +12108,7 @@
 </file>
 
 <file path=ppt/slides/slide6.xml><?xml version="1.0" encoding="utf-8"?>
-<p:sld xmlns:a="http://schemas.openxmlformats.org/drawingml/2006/main" xmlns:r="http://schemas.openxmlformats.org/officeDocument/2006/relationships" xmlns:p="http://schemas.openxmlformats.org/presentationml/2006/main">
+<p:sld xmlns:a="http://schemas.openxmlformats.org/drawingml/2006/main" xmlns:p="http://schemas.openxmlformats.org/presentationml/2006/main" xmlns:r="http://schemas.openxmlformats.org/officeDocument/2006/relationships">
   <p:cSld>
     <p:spTree>
       <p:nvGrpSpPr>
@@ -12279,7 +12279,7 @@
                 </a:solidFill>
                 <a:latin typeface="Times New Roman"/>
               </a:rPr>
-              <a:t>, Pandas, SciPy, Scikit-learn, Matplotlib, Seaborn, </a:t>
+              <a:t>, Pandas, SciPy, Scikit-learn, Matplotlib, Seaborn,</a:t>
             </a:r>
             <a:r>
               <a:rPr lang="en-US" sz="1800" b="0" strike="noStrike" spc="-1" dirty="0" err="1">
@@ -12417,7 +12417,7 @@
                 </a:solidFill>
                 <a:latin typeface="Times New Roman"/>
               </a:rPr>
-              <a:t>Data Visualization </a:t>
+              <a:t>Data Visualization</a:t>
             </a:r>
             <a:endParaRPr lang="en-US" sz="1800" b="0" strike="noStrike" spc="-1" dirty="0">
               <a:solidFill>
@@ -12457,7 +12457,7 @@
                 </a:solidFill>
                 <a:latin typeface="Times New Roman"/>
               </a:rPr>
-              <a:t>Statistical Analysis (e.g. correlation, significance test) </a:t>
+              <a:t>Statistical Analysis (e.g. correlation, significance test)</a:t>
             </a:r>
             <a:endParaRPr lang="en-US" sz="1800" b="0" strike="noStrike" spc="-1" dirty="0">
               <a:solidFill>
@@ -12537,7 +12537,7 @@
                 </a:solidFill>
                 <a:latin typeface="Times New Roman"/>
               </a:rPr>
-              <a:t>Supervised learning classifiers will be used for binary classification (e.g. random forest, logistic regression, SVMs, </a:t>
+              <a:t>Supervised learning classifiers will be used for Binary classification (e.g. random forest, logistic regression, SVMs,</a:t>
             </a:r>
             <a:r>
               <a:rPr lang="en-US" sz="1800" b="0" strike="noStrike" spc="-1" dirty="0" err="1">
@@ -12654,7 +12654,7 @@
 </file>
 
 <file path=ppt/slides/slide7.xml><?xml version="1.0" encoding="utf-8"?>
-<p:sld xmlns:a="http://schemas.openxmlformats.org/drawingml/2006/main" xmlns:r="http://schemas.openxmlformats.org/officeDocument/2006/relationships" xmlns:p="http://schemas.openxmlformats.org/presentationml/2006/main">
+<p:sld xmlns:a="http://schemas.openxmlformats.org/drawingml/2006/main" xmlns:ns2="http://schemas.microsoft.com/office/drawing/2014/main" xmlns:ns4="http://schemas.microsoft.com/office/powerpoint/2010/main" xmlns:p="http://schemas.openxmlformats.org/presentationml/2006/main" xmlns:r="http://schemas.openxmlformats.org/officeDocument/2006/relationships">
   <p:cSld>
     <p:spTree>
       <p:nvGrpSpPr>
@@ -12675,7 +12675,7 @@
           <p:cNvPr id="4" name="Picture 3">
             <a:extLst>
               <a:ext uri="{FF2B5EF4-FFF2-40B4-BE49-F238E27FC236}">
-                <a16:creationId xmlns:a16="http://schemas.microsoft.com/office/drawing/2014/main" id="{3906325C-1F00-411F-F856-74F18ADDA751}"/>
+                <ns2:creationId id="{3906325C-1F00-411F-F856-74F18ADDA751}"/>
               </a:ext>
             </a:extLst>
           </p:cNvPr>
@@ -12704,7 +12704,7 @@
           <p:cNvPr id="7" name="TextBox 4">
             <a:extLst>
               <a:ext uri="{FF2B5EF4-FFF2-40B4-BE49-F238E27FC236}">
-                <a16:creationId xmlns:a16="http://schemas.microsoft.com/office/drawing/2014/main" id="{F8CB3526-0425-FC53-D034-1CFB4484B94F}"/>
+                <ns2:creationId id="{F8CB3526-0425-FC53-D034-1CFB4484B94F}"/>
               </a:ext>
             </a:extLst>
           </p:cNvPr>
@@ -12770,7 +12770,7 @@
           <p:cNvPr id="8" name="TextBox 5">
             <a:extLst>
               <a:ext uri="{FF2B5EF4-FFF2-40B4-BE49-F238E27FC236}">
-                <a16:creationId xmlns:a16="http://schemas.microsoft.com/office/drawing/2014/main" id="{4994B655-6FA6-1732-1E79-1CA12246AC0B}"/>
+                <ns2:creationId id="{4994B655-6FA6-1732-1E79-1CA12246AC0B}"/>
               </a:ext>
             </a:extLst>
           </p:cNvPr>
@@ -12823,7 +12823,7 @@
                 <a:latin typeface="Times New Roman" panose="02020603050405020304" pitchFamily="18" charset="0"/>
                 <a:cs typeface="Times New Roman" panose="02020603050405020304" pitchFamily="18" charset="0"/>
               </a:rPr>
-              <a:t>Data Visualization </a:t>
+              <a:t>Data Visualization</a:t>
             </a:r>
             <a:endParaRPr lang="en-US" sz="2400" b="0" strike="noStrike" spc="-1" dirty="0">
               <a:solidFill>
@@ -12951,7 +12951,7 @@
                 <a:latin typeface="Times New Roman" panose="02020603050405020304" pitchFamily="18" charset="0"/>
                 <a:cs typeface="Times New Roman" panose="02020603050405020304" pitchFamily="18" charset="0"/>
               </a:rPr>
-              <a:t>Unsupervised Learning, Dimensional Reduction, and Confusion Matrix </a:t>
+              <a:t>Unsupervised Learning, Dimensional Reduction, and Confusion Matrix</a:t>
             </a:r>
           </a:p>
           <a:p>
@@ -12992,7 +12992,7 @@
                 <a:latin typeface="Times New Roman" panose="02020603050405020304" pitchFamily="18" charset="0"/>
                 <a:cs typeface="Times New Roman" panose="02020603050405020304" pitchFamily="18" charset="0"/>
               </a:rPr>
-              <a:t>Design Simple Machine Learning Algorithms </a:t>
+              <a:t>Design Simple Machine Learning Algorithms</a:t>
             </a:r>
           </a:p>
           <a:p>
@@ -13048,7 +13048,7 @@
     </p:spTree>
     <p:extLst>
       <p:ext uri="{BB962C8B-B14F-4D97-AF65-F5344CB8AC3E}">
-        <p14:creationId xmlns:p14="http://schemas.microsoft.com/office/powerpoint/2010/main" val="2781671770"/>
+        <ns4:creationId val="2781671770"/>
       </p:ext>
     </p:extLst>
   </p:cSld>
@@ -13059,7 +13059,7 @@
 </file>
 
 <file path=ppt/slides/slide8.xml><?xml version="1.0" encoding="utf-8"?>
-<p:sld xmlns:a="http://schemas.openxmlformats.org/drawingml/2006/main" xmlns:r="http://schemas.openxmlformats.org/officeDocument/2006/relationships" xmlns:p="http://schemas.openxmlformats.org/presentationml/2006/main">
+<p:sld xmlns:a="http://schemas.openxmlformats.org/drawingml/2006/main" xmlns:ns2="http://schemas.microsoft.com/office/drawing/2014/main" xmlns:ns4="http://schemas.microsoft.com/office/powerpoint/2010/main" xmlns:p="http://schemas.openxmlformats.org/presentationml/2006/main" xmlns:r="http://schemas.openxmlformats.org/officeDocument/2006/relationships">
   <p:cSld>
     <p:spTree>
       <p:nvGrpSpPr>
@@ -13080,7 +13080,7 @@
           <p:cNvPr id="4" name="TextBox 4">
             <a:extLst>
               <a:ext uri="{FF2B5EF4-FFF2-40B4-BE49-F238E27FC236}">
-                <a16:creationId xmlns:a16="http://schemas.microsoft.com/office/drawing/2014/main" id="{C78DD361-BAEE-808A-243E-D374C4E78425}"/>
+                <ns2:creationId id="{C78DD361-BAEE-808A-243E-D374C4E78425}"/>
               </a:ext>
             </a:extLst>
           </p:cNvPr>
@@ -13141,7 +13141,7 @@
           <p:cNvPr id="5" name="TextBox 4">
             <a:extLst>
               <a:ext uri="{FF2B5EF4-FFF2-40B4-BE49-F238E27FC236}">
-                <a16:creationId xmlns:a16="http://schemas.microsoft.com/office/drawing/2014/main" id="{BB4BA19C-B6DD-8664-40E1-0AF7D09DBD51}"/>
+                <ns2:creationId id="{BB4BA19C-B6DD-8664-40E1-0AF7D09DBD51}"/>
               </a:ext>
             </a:extLst>
           </p:cNvPr>
@@ -13169,7 +13169,7 @@
                 <a:latin typeface="Times New Roman" panose="02020603050405020304" pitchFamily="18" charset="0"/>
                 <a:cs typeface="Times New Roman" panose="02020603050405020304" pitchFamily="18" charset="0"/>
               </a:rPr>
-              <a:t>Libraries: </a:t>
+              <a:t>Libraries:</a:t>
             </a:r>
           </a:p>
           <a:p>
@@ -13205,7 +13205,7 @@
           <p:cNvPr id="6" name="Picture 5">
             <a:extLst>
               <a:ext uri="{FF2B5EF4-FFF2-40B4-BE49-F238E27FC236}">
-                <a16:creationId xmlns:a16="http://schemas.microsoft.com/office/drawing/2014/main" id="{F930B077-6032-198E-320B-9EC0AA507ED4}"/>
+                <ns2:creationId id="{F930B077-6032-198E-320B-9EC0AA507ED4}"/>
               </a:ext>
             </a:extLst>
           </p:cNvPr>
@@ -13235,7 +13235,7 @@
           <p:cNvPr id="7" name="Picture 6">
             <a:extLst>
               <a:ext uri="{FF2B5EF4-FFF2-40B4-BE49-F238E27FC236}">
-                <a16:creationId xmlns:a16="http://schemas.microsoft.com/office/drawing/2014/main" id="{2C9C2AB1-2276-4F39-5F31-71FDC0E4FFCB}"/>
+                <ns2:creationId id="{2C9C2AB1-2276-4F39-5F31-71FDC0E4FFCB}"/>
               </a:ext>
             </a:extLst>
           </p:cNvPr>
@@ -13265,7 +13265,7 @@
           <p:cNvPr id="10" name="Picture 9">
             <a:extLst>
               <a:ext uri="{FF2B5EF4-FFF2-40B4-BE49-F238E27FC236}">
-                <a16:creationId xmlns:a16="http://schemas.microsoft.com/office/drawing/2014/main" id="{B5C3573C-F675-989B-3C32-D27AFDA32415}"/>
+                <ns2:creationId id="{B5C3573C-F675-989B-3C32-D27AFDA32415}"/>
               </a:ext>
             </a:extLst>
           </p:cNvPr>
@@ -13295,7 +13295,7 @@
           <p:cNvPr id="11" name="Picture 10">
             <a:extLst>
               <a:ext uri="{FF2B5EF4-FFF2-40B4-BE49-F238E27FC236}">
-                <a16:creationId xmlns:a16="http://schemas.microsoft.com/office/drawing/2014/main" id="{E6EC1FC3-9790-CF4C-310F-DCE5893854F2}"/>
+                <ns2:creationId id="{E6EC1FC3-9790-CF4C-310F-DCE5893854F2}"/>
               </a:ext>
             </a:extLst>
           </p:cNvPr>
@@ -13322,7 +13322,7 @@
     </p:spTree>
     <p:extLst>
       <p:ext uri="{BB962C8B-B14F-4D97-AF65-F5344CB8AC3E}">
-        <p14:creationId xmlns:p14="http://schemas.microsoft.com/office/powerpoint/2010/main" val="4013086488"/>
+        <ns4:creationId val="4013086488"/>
       </p:ext>
     </p:extLst>
   </p:cSld>
@@ -13333,7 +13333,7 @@
 </file>
 
 <file path=ppt/slides/slide9.xml><?xml version="1.0" encoding="utf-8"?>
-<p:sld xmlns:a="http://schemas.openxmlformats.org/drawingml/2006/main" xmlns:r="http://schemas.openxmlformats.org/officeDocument/2006/relationships" xmlns:p="http://schemas.openxmlformats.org/presentationml/2006/main">
+<p:sld xmlns:a="http://schemas.openxmlformats.org/drawingml/2006/main" xmlns:ns2="http://schemas.microsoft.com/office/drawing/2014/main" xmlns:ns4="http://schemas.microsoft.com/office/powerpoint/2010/main" xmlns:p="http://schemas.openxmlformats.org/presentationml/2006/main" xmlns:r="http://schemas.openxmlformats.org/officeDocument/2006/relationships">
   <p:cSld>
     <p:spTree>
       <p:nvGrpSpPr>
@@ -13354,7 +13354,7 @@
           <p:cNvPr id="4" name="Picture 3">
             <a:extLst>
               <a:ext uri="{FF2B5EF4-FFF2-40B4-BE49-F238E27FC236}">
-                <a16:creationId xmlns:a16="http://schemas.microsoft.com/office/drawing/2014/main" id="{2486F1A8-9589-AC47-55BF-60B9E029597E}"/>
+                <ns2:creationId id="{2486F1A8-9589-AC47-55BF-60B9E029597E}"/>
               </a:ext>
             </a:extLst>
           </p:cNvPr>
@@ -13383,7 +13383,7 @@
           <p:cNvPr id="5" name="TextBox 4">
             <a:extLst>
               <a:ext uri="{FF2B5EF4-FFF2-40B4-BE49-F238E27FC236}">
-                <a16:creationId xmlns:a16="http://schemas.microsoft.com/office/drawing/2014/main" id="{9A472765-1F2F-7186-66AC-F438F7D362BE}"/>
+                <ns2:creationId id="{9A472765-1F2F-7186-66AC-F438F7D362BE}"/>
               </a:ext>
             </a:extLst>
           </p:cNvPr>
@@ -13440,7 +13440,7 @@
           <p:cNvPr id="6" name="TextBox 5">
             <a:extLst>
               <a:ext uri="{FF2B5EF4-FFF2-40B4-BE49-F238E27FC236}">
-                <a16:creationId xmlns:a16="http://schemas.microsoft.com/office/drawing/2014/main" id="{31FDDEB0-F436-19AB-9347-62F149020E08}"/>
+                <ns2:creationId id="{31FDDEB0-F436-19AB-9347-62F149020E08}"/>
               </a:ext>
             </a:extLst>
           </p:cNvPr>
@@ -13493,7 +13493,7 @@
                 <a:latin typeface="Times New Roman" panose="02020603050405020304" pitchFamily="18" charset="0"/>
                 <a:cs typeface="Times New Roman" panose="02020603050405020304" pitchFamily="18" charset="0"/>
               </a:rPr>
-              <a:t>How to work with </a:t>
+              <a:t>How to work with</a:t>
             </a:r>
             <a:r>
               <a:rPr lang="en-US" sz="2400" spc="-1" dirty="0">
@@ -13513,7 +13513,7 @@
                 <a:latin typeface="Times New Roman" panose="02020603050405020304" pitchFamily="18" charset="0"/>
                 <a:cs typeface="Times New Roman" panose="02020603050405020304" pitchFamily="18" charset="0"/>
               </a:rPr>
-              <a:t> and Pandas </a:t>
+              <a:t>and Pandas</a:t>
             </a:r>
             <a:r>
               <a:rPr lang="en-US" sz="2400" b="0" strike="noStrike" spc="-1" dirty="0" err="1">
@@ -13595,7 +13595,7 @@
           <p:cNvPr id="7" name="Picture 6">
             <a:extLst>
               <a:ext uri="{FF2B5EF4-FFF2-40B4-BE49-F238E27FC236}">
-                <a16:creationId xmlns:a16="http://schemas.microsoft.com/office/drawing/2014/main" id="{6F5EFE68-50F8-EB4B-A5D6-A28ACF9323D3}"/>
+                <ns2:creationId id="{6F5EFE68-50F8-EB4B-A5D6-A28ACF9323D3}"/>
               </a:ext>
             </a:extLst>
           </p:cNvPr>
@@ -13623,7 +13623,7 @@
     </p:spTree>
     <p:extLst>
       <p:ext uri="{BB962C8B-B14F-4D97-AF65-F5344CB8AC3E}">
-        <p14:creationId xmlns:p14="http://schemas.microsoft.com/office/powerpoint/2010/main" val="1156944145"/>
+        <ns4:creationId val="1156944145"/>
       </p:ext>
     </p:extLst>
   </p:cSld>

</xml_diff>